<commit_message>
changed homework numbers so they were in sequence.
</commit_message>
<xml_diff>
--- a/week10/week10.pptx
+++ b/week10/week10.pptx
@@ -11116,7 +11116,7 @@
               <a:t>    # Replace this with your </a:t>
             </a:r>
             <a:r>
-              <a:rPr lang="en-GB">
+              <a:rPr lang="en-GB" dirty="0" err="1">
                 <a:latin typeface="Courier New" panose="02070309020205020404" pitchFamily="49" charset="0"/>
                 <a:cs typeface="Courier New" panose="02070309020205020404" pitchFamily="49" charset="0"/>
               </a:rPr>
@@ -11558,7 +11558,7 @@
                 <a:latin typeface="Courier New" panose="02070309020205020404" pitchFamily="49" charset="0"/>
                 <a:cs typeface="Courier New" panose="02070309020205020404" pitchFamily="49" charset="0"/>
               </a:rPr>
-              <a:t># Week10, Homework4, Question</a:t>
+              <a:t># Week10, Homework3, Question</a:t>
             </a:r>
           </a:p>
           <a:p>
@@ -12159,7 +12159,7 @@
                 <a:latin typeface="Courier New" panose="02070309020205020404" pitchFamily="49" charset="0"/>
                 <a:cs typeface="Courier New" panose="02070309020205020404" pitchFamily="49" charset="0"/>
               </a:rPr>
-              <a:t># Week10, Homework5, Question</a:t>
+              <a:t># Week10, Homework4, Question</a:t>
             </a:r>
           </a:p>
           <a:p>
@@ -12614,8 +12614,19 @@
                 <a:latin typeface="Courier New" panose="02070309020205020404" pitchFamily="49" charset="0"/>
                 <a:cs typeface="Courier New" panose="02070309020205020404" pitchFamily="49" charset="0"/>
               </a:rPr>
-              <a:t>Week10, Homework6</a:t>
-            </a:r>
+              <a:t>Week10</a:t>
+            </a:r>
+            <a:r>
+              <a:rPr lang="en-GB" sz="1100">
+                <a:latin typeface="Courier New" panose="02070309020205020404" pitchFamily="49" charset="0"/>
+                <a:cs typeface="Courier New" panose="02070309020205020404" pitchFamily="49" charset="0"/>
+              </a:rPr>
+              <a:t>, Homework5</a:t>
+            </a:r>
+            <a:endParaRPr lang="en-GB" sz="1100" dirty="0">
+              <a:latin typeface="Courier New" panose="02070309020205020404" pitchFamily="49" charset="0"/>
+              <a:cs typeface="Courier New" panose="02070309020205020404" pitchFamily="49" charset="0"/>
+            </a:endParaRPr>
           </a:p>
           <a:p>
             <a:endParaRPr lang="en-GB" sz="1100" dirty="0">

</xml_diff>